<commit_message>
Change name case in powerpoint
</commit_message>
<xml_diff>
--- a/documentation/Yoctopuce.pptx
+++ b/documentation/Yoctopuce.pptx
@@ -4483,7 +4483,7 @@
           <a:lstStyle/>
           <a:p>
             <a:r>
-              <a:rPr lang="en-US" smtClean="0"/>
+              <a:rPr lang="en-US" dirty="0" err="1" smtClean="0"/>
               <a:t>Yoctopuce</a:t>
             </a:r>
             <a:endParaRPr lang="en-US" dirty="0"/>
@@ -4978,22 +4978,14 @@
           <a:p>
             <a:r>
               <a:rPr lang="fr-CH" dirty="0" smtClean="0"/>
-              <a:t>Détection des </a:t>
-            </a:r>
+              <a:t>Détection des capteurs</a:t>
+            </a:r>
+            <a:endParaRPr lang="fr-CH" dirty="0"/>
+          </a:p>
+          <a:p>
             <a:r>
               <a:rPr lang="fr-CH" dirty="0" smtClean="0"/>
-              <a:t>capteurs</a:t>
-            </a:r>
-            <a:endParaRPr lang="fr-CH" dirty="0"/>
-          </a:p>
-          <a:p>
-            <a:r>
-              <a:rPr lang="fr-CH" dirty="0" smtClean="0"/>
-              <a:t>Prise en main de </a:t>
-            </a:r>
-            <a:r>
-              <a:rPr lang="fr-CH" dirty="0" smtClean="0"/>
-              <a:t>Lumen</a:t>
+              <a:t>Prise en main de Lumen</a:t>
             </a:r>
             <a:endParaRPr lang="fr-CH" dirty="0"/>
           </a:p>
@@ -5610,8 +5602,21 @@
           <a:p>
             <a:r>
               <a:rPr lang="fr-CH" sz="1400" dirty="0"/>
-              <a:t>Charneco, meissner, Oliveira, stähli</a:t>
-            </a:r>
+              <a:t>Charneco, </a:t>
+            </a:r>
+            <a:r>
+              <a:rPr lang="fr-CH" sz="1400" dirty="0" smtClean="0"/>
+              <a:t>Meissner</a:t>
+            </a:r>
+            <a:r>
+              <a:rPr lang="fr-CH" sz="1400" dirty="0"/>
+              <a:t>, Oliveira, </a:t>
+            </a:r>
+            <a:r>
+              <a:rPr lang="fr-CH" sz="1400" dirty="0" err="1" smtClean="0"/>
+              <a:t>Stähli</a:t>
+            </a:r>
+            <a:endParaRPr lang="fr-CH" sz="1400" dirty="0"/>
           </a:p>
         </p:txBody>
       </p:sp>
@@ -8930,7 +8935,7 @@
           <p:nvPr>
             <p:extLst>
               <p:ext uri="{D42A27DB-BD31-4B8C-83A1-F6EECF244321}">
-                <p14:modId xmlns:p14="http://schemas.microsoft.com/office/powerpoint/2010/main" val="263025134"/>
+                <p14:modId xmlns:p14="http://schemas.microsoft.com/office/powerpoint/2010/main" val="3215631701"/>
               </p:ext>
             </p:extLst>
           </p:nvPr>
@@ -9116,8 +9121,13 @@
                     <a:p>
                       <a:r>
                         <a:rPr lang="fr-CH" dirty="0"/>
-                        <a:t>2020-01-27 14:00:00</a:t>
+                        <a:t>2020-01-27 </a:t>
                       </a:r>
+                      <a:r>
+                        <a:rPr lang="fr-CH" dirty="0" smtClean="0"/>
+                        <a:t>00:00:00</a:t>
+                      </a:r>
+                      <a:endParaRPr lang="fr-CH" dirty="0"/>
                     </a:p>
                   </a:txBody>
                   <a:tcPr/>

</xml_diff>

<commit_message>
Add space before double comma
</commit_message>
<xml_diff>
--- a/documentation/Yoctopuce.pptx
+++ b/documentation/Yoctopuce.pptx
@@ -5986,7 +5986,7 @@
           <p:nvPr>
             <p:extLst>
               <p:ext uri="{D42A27DB-BD31-4B8C-83A1-F6EECF244321}">
-                <p14:modId xmlns:p14="http://schemas.microsoft.com/office/powerpoint/2010/main" val="1997523746"/>
+                <p14:modId xmlns:p14="http://schemas.microsoft.com/office/powerpoint/2010/main" val="401606270"/>
               </p:ext>
             </p:extLst>
           </p:nvPr>
@@ -6223,9 +6223,14 @@
                     <a:lstStyle/>
                     <a:p>
                       <a:r>
-                        <a:rPr lang="fr-CH" dirty="0"/>
+                        <a:rPr lang="fr-CH" dirty="0" err="1" smtClean="0"/>
                         <a:t>Backend</a:t>
                       </a:r>
+                      <a:r>
+                        <a:rPr lang="fr-CH" dirty="0" smtClean="0"/>
+                        <a:t> (C#)</a:t>
+                      </a:r>
+                      <a:endParaRPr lang="fr-CH" dirty="0"/>
                     </a:p>
                   </a:txBody>
                   <a:tcPr/>
@@ -6470,7 +6475,11 @@
                       </a:r>
                       <a:r>
                         <a:rPr lang="fr-CH" baseline="0" dirty="0"/>
-                        <a:t> tech</a:t>
+                        <a:t> </a:t>
+                      </a:r>
+                      <a:r>
+                        <a:rPr lang="fr-CH" baseline="0" dirty="0" smtClean="0"/>
+                        <a:t>technique</a:t>
                       </a:r>
                       <a:endParaRPr lang="fr-CH" dirty="0"/>
                     </a:p>
@@ -6554,8 +6563,13 @@
                     <a:p>
                       <a:r>
                         <a:rPr lang="fr-CH" dirty="0"/>
-                        <a:t>Doc Utilisateur</a:t>
+                        <a:t>Doc </a:t>
                       </a:r>
+                      <a:r>
+                        <a:rPr lang="fr-CH" dirty="0" smtClean="0"/>
+                        <a:t>utilisateur</a:t>
+                      </a:r>
+                      <a:endParaRPr lang="fr-CH" dirty="0"/>
                     </a:p>
                   </a:txBody>
                   <a:tcPr/>
@@ -7066,9 +7080,14 @@
               <a:buNone/>
             </a:pPr>
             <a:r>
-              <a:rPr lang="fr-CH" dirty="0"/>
-              <a:t>Backend:</a:t>
-            </a:r>
+              <a:rPr lang="fr-CH" dirty="0" err="1" smtClean="0"/>
+              <a:t>Backend</a:t>
+            </a:r>
+            <a:r>
+              <a:rPr lang="fr-CH" dirty="0" smtClean="0"/>
+              <a:t> :</a:t>
+            </a:r>
+            <a:endParaRPr lang="fr-CH" dirty="0"/>
           </a:p>
           <a:p>
             <a:r>
@@ -7118,9 +7137,14 @@
               <a:buNone/>
             </a:pPr>
             <a:r>
-              <a:rPr lang="fr-CH" dirty="0"/>
-              <a:t>Frontend:</a:t>
-            </a:r>
+              <a:rPr lang="fr-CH" dirty="0" err="1" smtClean="0"/>
+              <a:t>Frontend</a:t>
+            </a:r>
+            <a:r>
+              <a:rPr lang="fr-CH" dirty="0" smtClean="0"/>
+              <a:t> :</a:t>
+            </a:r>
+            <a:endParaRPr lang="fr-CH" dirty="0"/>
           </a:p>
           <a:p>
             <a:r>
@@ -7143,9 +7167,10 @@
               <a:buNone/>
             </a:pPr>
             <a:r>
-              <a:rPr lang="fr-CH" dirty="0"/>
-              <a:t>Documentation</a:t>
-            </a:r>
+              <a:rPr lang="fr-CH" dirty="0" smtClean="0"/>
+              <a:t>Documentation :</a:t>
+            </a:r>
+            <a:endParaRPr lang="fr-CH" dirty="0"/>
           </a:p>
           <a:p>
             <a:r>
@@ -8006,19 +8031,88 @@
       </p:sp>
       <p:sp>
         <p:nvSpPr>
-          <p:cNvPr id="27" name="Flèche gauche 26"/>
+          <p:cNvPr id="6" name="Espace réservé de la date 5"/>
+          <p:cNvSpPr>
+            <a:spLocks noGrp="1"/>
+          </p:cNvSpPr>
+          <p:nvPr>
+            <p:ph type="dt" sz="half" idx="10"/>
+          </p:nvPr>
+        </p:nvSpPr>
+        <p:spPr/>
+        <p:txBody>
+          <a:bodyPr/>
+          <a:lstStyle/>
+          <a:p>
+            <a:fld id="{239DC089-C9CD-4620-8366-FD6A032A413F}" type="datetime1">
+              <a:rPr lang="fr-CH" smtClean="0"/>
+              <a:t>17.03.2021</a:t>
+            </a:fld>
+            <a:endParaRPr lang="en-US" dirty="0"/>
+          </a:p>
+        </p:txBody>
+      </p:sp>
+      <p:sp>
+        <p:nvSpPr>
+          <p:cNvPr id="17" name="Espace réservé du pied de page 16"/>
+          <p:cNvSpPr>
+            <a:spLocks noGrp="1"/>
+          </p:cNvSpPr>
+          <p:nvPr>
+            <p:ph type="ftr" sz="quarter" idx="11"/>
+          </p:nvPr>
+        </p:nvSpPr>
+        <p:spPr/>
+        <p:txBody>
+          <a:bodyPr/>
+          <a:lstStyle/>
+          <a:p>
+            <a:r>
+              <a:rPr lang="en-US" smtClean="0"/>
+              <a:t>Yoctopuce</a:t>
+            </a:r>
+            <a:endParaRPr lang="en-US" dirty="0"/>
+          </a:p>
+        </p:txBody>
+      </p:sp>
+      <p:sp>
+        <p:nvSpPr>
+          <p:cNvPr id="20" name="Espace réservé du numéro de diapositive 19"/>
+          <p:cNvSpPr>
+            <a:spLocks noGrp="1"/>
+          </p:cNvSpPr>
+          <p:nvPr>
+            <p:ph type="sldNum" sz="quarter" idx="12"/>
+          </p:nvPr>
+        </p:nvSpPr>
+        <p:spPr/>
+        <p:txBody>
+          <a:bodyPr/>
+          <a:lstStyle/>
+          <a:p>
+            <a:fld id="{D57F1E4F-1CFF-5643-939E-02111984F565}" type="slidenum">
+              <a:rPr lang="en-US" smtClean="0"/>
+              <a:t>7</a:t>
+            </a:fld>
+            <a:endParaRPr lang="en-US" dirty="0"/>
+          </a:p>
+        </p:txBody>
+      </p:sp>
+      <p:sp>
+        <p:nvSpPr>
+          <p:cNvPr id="24" name="Double flèche horizontale 23"/>
           <p:cNvSpPr/>
           <p:nvPr/>
         </p:nvSpPr>
         <p:spPr>
-          <a:xfrm rot="11906302">
-            <a:off x="3273066" y="4776175"/>
-            <a:ext cx="1368871" cy="311202"/>
+          <a:xfrm rot="1512843">
+            <a:off x="3090859" y="4600790"/>
+            <a:ext cx="1802204" cy="316597"/>
           </a:xfrm>
-          <a:prstGeom prst="leftArrow">
+          <a:prstGeom prst="leftRightArrow">
             <a:avLst>
-              <a:gd name="adj1" fmla="val 44123"/>
-              <a:gd name="adj2" fmla="val 123457"/>
+              <a:gd name="adj1" fmla="val 50000"/>
+              <a:gd name="adj2" fmla="val 113372"/>
             </a:avLst>
           </a:prstGeom>
         </p:spPr>
@@ -8049,19 +8143,19 @@
       </p:sp>
       <p:sp>
         <p:nvSpPr>
-          <p:cNvPr id="28" name="Flèche gauche 27"/>
+          <p:cNvPr id="30" name="Double flèche horizontale 29"/>
           <p:cNvSpPr/>
           <p:nvPr/>
         </p:nvSpPr>
         <p:spPr>
-          <a:xfrm rot="10800000">
-            <a:off x="6578423" y="5061243"/>
-            <a:ext cx="1560174" cy="311202"/>
+          <a:xfrm>
+            <a:off x="6462741" y="5032755"/>
+            <a:ext cx="1690659" cy="316597"/>
           </a:xfrm>
-          <a:prstGeom prst="leftArrow">
+          <a:prstGeom prst="leftRightArrow">
             <a:avLst>
-              <a:gd name="adj1" fmla="val 44123"/>
-              <a:gd name="adj2" fmla="val 123457"/>
+              <a:gd name="adj1" fmla="val 50000"/>
+              <a:gd name="adj2" fmla="val 113372"/>
             </a:avLst>
           </a:prstGeom>
         </p:spPr>
@@ -8087,75 +8181,6 @@
           <a:p>
             <a:pPr algn="ctr"/>
             <a:endParaRPr lang="fr-CH"/>
-          </a:p>
-        </p:txBody>
-      </p:sp>
-      <p:sp>
-        <p:nvSpPr>
-          <p:cNvPr id="6" name="Espace réservé de la date 5"/>
-          <p:cNvSpPr>
-            <a:spLocks noGrp="1"/>
-          </p:cNvSpPr>
-          <p:nvPr>
-            <p:ph type="dt" sz="half" idx="10"/>
-          </p:nvPr>
-        </p:nvSpPr>
-        <p:spPr/>
-        <p:txBody>
-          <a:bodyPr/>
-          <a:lstStyle/>
-          <a:p>
-            <a:fld id="{239DC089-C9CD-4620-8366-FD6A032A413F}" type="datetime1">
-              <a:rPr lang="fr-CH" smtClean="0"/>
-              <a:t>17.03.2021</a:t>
-            </a:fld>
-            <a:endParaRPr lang="en-US" dirty="0"/>
-          </a:p>
-        </p:txBody>
-      </p:sp>
-      <p:sp>
-        <p:nvSpPr>
-          <p:cNvPr id="17" name="Espace réservé du pied de page 16"/>
-          <p:cNvSpPr>
-            <a:spLocks noGrp="1"/>
-          </p:cNvSpPr>
-          <p:nvPr>
-            <p:ph type="ftr" sz="quarter" idx="11"/>
-          </p:nvPr>
-        </p:nvSpPr>
-        <p:spPr/>
-        <p:txBody>
-          <a:bodyPr/>
-          <a:lstStyle/>
-          <a:p>
-            <a:r>
-              <a:rPr lang="en-US" smtClean="0"/>
-              <a:t>Yoctopuce</a:t>
-            </a:r>
-            <a:endParaRPr lang="en-US" dirty="0"/>
-          </a:p>
-        </p:txBody>
-      </p:sp>
-      <p:sp>
-        <p:nvSpPr>
-          <p:cNvPr id="20" name="Espace réservé du numéro de diapositive 19"/>
-          <p:cNvSpPr>
-            <a:spLocks noGrp="1"/>
-          </p:cNvSpPr>
-          <p:nvPr>
-            <p:ph type="sldNum" sz="quarter" idx="12"/>
-          </p:nvPr>
-        </p:nvSpPr>
-        <p:spPr/>
-        <p:txBody>
-          <a:bodyPr/>
-          <a:lstStyle/>
-          <a:p>
-            <a:fld id="{D57F1E4F-1CFF-5643-939E-02111984F565}" type="slidenum">
-              <a:rPr lang="en-US" smtClean="0"/>
-              <a:t>7</a:t>
-            </a:fld>
-            <a:endParaRPr lang="en-US" dirty="0"/>
           </a:p>
         </p:txBody>
       </p:sp>

</xml_diff>